<commit_message>
mid day fixes, objectives day 2-half way
</commit_message>
<xml_diff>
--- a/day-1/slides/ppt/React Core Concepts.pptx
+++ b/day-1/slides/ppt/React Core Concepts.pptx
@@ -9204,7 +9204,17 @@
               <a:t>{</a:t>
             </a:r>
             <a:r>
-              <a:rPr lang="en-US" sz="1100" b="0" dirty="0">
+              <a:rPr lang="en-US" sz="1100" b="0" dirty="0" err="1">
+                <a:solidFill>
+                  <a:srgbClr val="569CD6"/>
+                </a:solidFill>
+                <a:effectLst/>
+                <a:latin typeface="Menlo" panose="020B0609030804020204" pitchFamily="49" charset="0"/>
+              </a:rPr>
+              <a:t>this.state.</a:t>
+            </a:r>
+            <a:r>
+              <a:rPr lang="en-US" sz="1100" b="0" dirty="0" err="1">
                 <a:solidFill>
                   <a:srgbClr val="9CDCFE"/>
                 </a:solidFill>

</xml_diff>